<commit_message>
emphasis on discovering a URL which point to a TD, not a TD itself
</commit_message>
<xml_diff>
--- a/PRESENTATIONS/2020-10-online-f2f/2020-10-20-WoT-F2F-Discovery-Introduction-Mechanisms-Toumura.pptx
+++ b/PRESENTATIONS/2020-10-online-f2f/2020-10-20-WoT-F2F-Discovery-Introduction-Mechanisms-Toumura.pptx
@@ -150,10 +150,256 @@
 <file path=ppt/revisionInfo.xml><?xml version="1.0" encoding="utf-8"?>
 <p1510:revInfo xmlns:a="http://schemas.openxmlformats.org/drawingml/2006/main" xmlns:r="http://schemas.openxmlformats.org/officeDocument/2006/relationships" xmlns:p1510="http://schemas.microsoft.com/office/powerpoint/2015/10/main">
   <p1510:revLst>
-    <p1510:client id="{AB5500E3-602C-40D0-860E-3A008700A984}" v="2" dt="2020-10-19T04:50:15.683"/>
-    <p1510:client id="{E4505F40-E669-9843-86C7-DDD04F4FF44E}" v="52" dt="2020-10-19T04:07:02.618"/>
+    <p1510:client id="{E4505F40-E669-9843-86C7-DDD04F4FF44E}" v="64" dt="2020-10-20T08:05:26.088"/>
   </p1510:revLst>
 </p1510:revInfo>
+</file>
+
+<file path=ppt/changesInfos/changesInfo1.xml><?xml version="1.0" encoding="utf-8"?>
+<pc:chgInfo xmlns:a="http://schemas.openxmlformats.org/drawingml/2006/main" xmlns:r="http://schemas.openxmlformats.org/officeDocument/2006/relationships" xmlns:ac="http://schemas.microsoft.com/office/drawing/2013/main/command" xmlns:pc="http://schemas.microsoft.com/office/powerpoint/2013/main/command">
+  <pc:docChgLst>
+    <pc:chgData name="東村邦彦 / TOUMURA，KUNIHIKO" userId="aa80352f-8581-4c8d-8917-6e2824d17308" providerId="ADAL" clId="{E4505F40-E669-9843-86C7-DDD04F4FF44E}"/>
+    <pc:docChg chg="undo custSel modSld">
+      <pc:chgData name="東村邦彦 / TOUMURA，KUNIHIKO" userId="aa80352f-8581-4c8d-8917-6e2824d17308" providerId="ADAL" clId="{E4505F40-E669-9843-86C7-DDD04F4FF44E}" dt="2020-10-20T08:05:40.724" v="656" actId="478"/>
+      <pc:docMkLst>
+        <pc:docMk/>
+      </pc:docMkLst>
+      <pc:sldChg chg="addSp delSp modSp mod">
+        <pc:chgData name="東村邦彦 / TOUMURA，KUNIHIKO" userId="aa80352f-8581-4c8d-8917-6e2824d17308" providerId="ADAL" clId="{E4505F40-E669-9843-86C7-DDD04F4FF44E}" dt="2020-10-20T08:05:40.724" v="656" actId="478"/>
+        <pc:sldMkLst>
+          <pc:docMk/>
+          <pc:sldMk cId="1091312084" sldId="258"/>
+        </pc:sldMkLst>
+        <pc:spChg chg="mod">
+          <ac:chgData name="東村邦彦 / TOUMURA，KUNIHIKO" userId="aa80352f-8581-4c8d-8917-6e2824d17308" providerId="ADAL" clId="{E4505F40-E669-9843-86C7-DDD04F4FF44E}" dt="2020-10-20T07:20:09.922" v="277" actId="27636"/>
+          <ac:spMkLst>
+            <pc:docMk/>
+            <pc:sldMk cId="1091312084" sldId="258"/>
+            <ac:spMk id="13" creationId="{E46CFCC3-43F7-8F41-91C7-305DE559D4D0}"/>
+          </ac:spMkLst>
+        </pc:spChg>
+        <pc:picChg chg="add mod">
+          <ac:chgData name="東村邦彦 / TOUMURA，KUNIHIKO" userId="aa80352f-8581-4c8d-8917-6e2824d17308" providerId="ADAL" clId="{E4505F40-E669-9843-86C7-DDD04F4FF44E}" dt="2020-10-20T06:57:46.654" v="9" actId="1076"/>
+          <ac:picMkLst>
+            <pc:docMk/>
+            <pc:sldMk cId="1091312084" sldId="258"/>
+            <ac:picMk id="7" creationId="{F0E0DDF5-60B4-1243-B6A0-B62270B5876F}"/>
+          </ac:picMkLst>
+        </pc:picChg>
+        <pc:picChg chg="add del mod">
+          <ac:chgData name="東村邦彦 / TOUMURA，KUNIHIKO" userId="aa80352f-8581-4c8d-8917-6e2824d17308" providerId="ADAL" clId="{E4505F40-E669-9843-86C7-DDD04F4FF44E}" dt="2020-10-20T08:05:40.724" v="656" actId="478"/>
+          <ac:picMkLst>
+            <pc:docMk/>
+            <pc:sldMk cId="1091312084" sldId="258"/>
+            <ac:picMk id="9" creationId="{F59CE776-88F0-BE44-9974-0D7C4F26EDF5}"/>
+          </ac:picMkLst>
+        </pc:picChg>
+        <pc:picChg chg="mod">
+          <ac:chgData name="東村邦彦 / TOUMURA，KUNIHIKO" userId="aa80352f-8581-4c8d-8917-6e2824d17308" providerId="ADAL" clId="{E4505F40-E669-9843-86C7-DDD04F4FF44E}" dt="2020-10-20T06:56:40.514" v="0" actId="1076"/>
+          <ac:picMkLst>
+            <pc:docMk/>
+            <pc:sldMk cId="1091312084" sldId="258"/>
+            <ac:picMk id="12" creationId="{CAD14516-83E8-2E49-BB6C-E3D27DA45B1E}"/>
+          </ac:picMkLst>
+        </pc:picChg>
+      </pc:sldChg>
+      <pc:sldChg chg="addSp delSp modSp mod">
+        <pc:chgData name="東村邦彦 / TOUMURA，KUNIHIKO" userId="aa80352f-8581-4c8d-8917-6e2824d17308" providerId="ADAL" clId="{E4505F40-E669-9843-86C7-DDD04F4FF44E}" dt="2020-10-20T07:57:01.525" v="492" actId="20577"/>
+        <pc:sldMkLst>
+          <pc:docMk/>
+          <pc:sldMk cId="3089319073" sldId="259"/>
+        </pc:sldMkLst>
+        <pc:spChg chg="add del mod">
+          <ac:chgData name="東村邦彦 / TOUMURA，KUNIHIKO" userId="aa80352f-8581-4c8d-8917-6e2824d17308" providerId="ADAL" clId="{E4505F40-E669-9843-86C7-DDD04F4FF44E}" dt="2020-10-20T07:36:32.544" v="381" actId="478"/>
+          <ac:spMkLst>
+            <pc:docMk/>
+            <pc:sldMk cId="3089319073" sldId="259"/>
+            <ac:spMk id="3" creationId="{497DB6C0-CA63-CE43-8FDF-A7AC3189D125}"/>
+          </ac:spMkLst>
+        </pc:spChg>
+        <pc:spChg chg="add del mod">
+          <ac:chgData name="東村邦彦 / TOUMURA，KUNIHIKO" userId="aa80352f-8581-4c8d-8917-6e2824d17308" providerId="ADAL" clId="{E4505F40-E669-9843-86C7-DDD04F4FF44E}" dt="2020-10-20T07:36:32.544" v="381" actId="478"/>
+          <ac:spMkLst>
+            <pc:docMk/>
+            <pc:sldMk cId="3089319073" sldId="259"/>
+            <ac:spMk id="7" creationId="{96F0119A-5A8D-CA47-B537-64FDA9E86C43}"/>
+          </ac:spMkLst>
+        </pc:spChg>
+        <pc:spChg chg="add del mod">
+          <ac:chgData name="東村邦彦 / TOUMURA，KUNIHIKO" userId="aa80352f-8581-4c8d-8917-6e2824d17308" providerId="ADAL" clId="{E4505F40-E669-9843-86C7-DDD04F4FF44E}" dt="2020-10-20T07:36:31.052" v="380"/>
+          <ac:spMkLst>
+            <pc:docMk/>
+            <pc:sldMk cId="3089319073" sldId="259"/>
+            <ac:spMk id="8" creationId="{195B2447-2C21-DB4E-9C49-3360CC89F63C}"/>
+          </ac:spMkLst>
+        </pc:spChg>
+        <pc:spChg chg="add del mod">
+          <ac:chgData name="東村邦彦 / TOUMURA，KUNIHIKO" userId="aa80352f-8581-4c8d-8917-6e2824d17308" providerId="ADAL" clId="{E4505F40-E669-9843-86C7-DDD04F4FF44E}" dt="2020-10-20T07:04:28.607" v="180" actId="478"/>
+          <ac:spMkLst>
+            <pc:docMk/>
+            <pc:sldMk cId="3089319073" sldId="259"/>
+            <ac:spMk id="13" creationId="{03EF0244-AB95-5D40-A581-0450DA15B9FF}"/>
+          </ac:spMkLst>
+        </pc:spChg>
+        <pc:spChg chg="mod">
+          <ac:chgData name="東村邦彦 / TOUMURA，KUNIHIKO" userId="aa80352f-8581-4c8d-8917-6e2824d17308" providerId="ADAL" clId="{E4505F40-E669-9843-86C7-DDD04F4FF44E}" dt="2020-10-20T07:46:11.756" v="424" actId="5793"/>
+          <ac:spMkLst>
+            <pc:docMk/>
+            <pc:sldMk cId="3089319073" sldId="259"/>
+            <ac:spMk id="15" creationId="{8DFB5C70-A942-2641-84EF-1ADAB8A781E2}"/>
+          </ac:spMkLst>
+        </pc:spChg>
+        <pc:spChg chg="mod">
+          <ac:chgData name="東村邦彦 / TOUMURA，KUNIHIKO" userId="aa80352f-8581-4c8d-8917-6e2824d17308" providerId="ADAL" clId="{E4505F40-E669-9843-86C7-DDD04F4FF44E}" dt="2020-10-20T07:57:01.525" v="492" actId="20577"/>
+          <ac:spMkLst>
+            <pc:docMk/>
+            <pc:sldMk cId="3089319073" sldId="259"/>
+            <ac:spMk id="16" creationId="{55E89564-A8A7-9341-BF69-FC368B517A34}"/>
+          </ac:spMkLst>
+        </pc:spChg>
+        <pc:spChg chg="del">
+          <ac:chgData name="東村邦彦 / TOUMURA，KUNIHIKO" userId="aa80352f-8581-4c8d-8917-6e2824d17308" providerId="ADAL" clId="{E4505F40-E669-9843-86C7-DDD04F4FF44E}" dt="2020-10-20T06:59:04.571" v="15" actId="478"/>
+          <ac:spMkLst>
+            <pc:docMk/>
+            <pc:sldMk cId="3089319073" sldId="259"/>
+            <ac:spMk id="17" creationId="{8B07DE17-690D-1B41-B644-94C4C58280A1}"/>
+          </ac:spMkLst>
+        </pc:spChg>
+        <pc:spChg chg="add del mod">
+          <ac:chgData name="東村邦彦 / TOUMURA，KUNIHIKO" userId="aa80352f-8581-4c8d-8917-6e2824d17308" providerId="ADAL" clId="{E4505F40-E669-9843-86C7-DDD04F4FF44E}" dt="2020-10-20T07:36:32.544" v="381" actId="478"/>
+          <ac:spMkLst>
+            <pc:docMk/>
+            <pc:sldMk cId="3089319073" sldId="259"/>
+            <ac:spMk id="18" creationId="{F4C96A9C-8EB9-A940-803D-993882BBF86D}"/>
+          </ac:spMkLst>
+        </pc:spChg>
+        <pc:spChg chg="add del mod">
+          <ac:chgData name="東村邦彦 / TOUMURA，KUNIHIKO" userId="aa80352f-8581-4c8d-8917-6e2824d17308" providerId="ADAL" clId="{E4505F40-E669-9843-86C7-DDD04F4FF44E}" dt="2020-10-20T07:36:32.544" v="381" actId="478"/>
+          <ac:spMkLst>
+            <pc:docMk/>
+            <pc:sldMk cId="3089319073" sldId="259"/>
+            <ac:spMk id="19" creationId="{D0586B3A-F28F-1A46-8FB2-515F7ACB46D4}"/>
+          </ac:spMkLst>
+        </pc:spChg>
+        <pc:picChg chg="del">
+          <ac:chgData name="東村邦彦 / TOUMURA，KUNIHIKO" userId="aa80352f-8581-4c8d-8917-6e2824d17308" providerId="ADAL" clId="{E4505F40-E669-9843-86C7-DDD04F4FF44E}" dt="2020-10-20T06:59:02.385" v="14" actId="478"/>
+          <ac:picMkLst>
+            <pc:docMk/>
+            <pc:sldMk cId="3089319073" sldId="259"/>
+            <ac:picMk id="14" creationId="{14931EF9-A841-504B-89CC-7E6A22318043}"/>
+          </ac:picMkLst>
+        </pc:picChg>
+      </pc:sldChg>
+      <pc:sldChg chg="modSp mod">
+        <pc:chgData name="東村邦彦 / TOUMURA，KUNIHIKO" userId="aa80352f-8581-4c8d-8917-6e2824d17308" providerId="ADAL" clId="{E4505F40-E669-9843-86C7-DDD04F4FF44E}" dt="2020-10-20T07:47:23.702" v="449" actId="20577"/>
+        <pc:sldMkLst>
+          <pc:docMk/>
+          <pc:sldMk cId="4231749475" sldId="261"/>
+        </pc:sldMkLst>
+        <pc:spChg chg="mod">
+          <ac:chgData name="東村邦彦 / TOUMURA，KUNIHIKO" userId="aa80352f-8581-4c8d-8917-6e2824d17308" providerId="ADAL" clId="{E4505F40-E669-9843-86C7-DDD04F4FF44E}" dt="2020-10-20T07:47:23.702" v="449" actId="20577"/>
+          <ac:spMkLst>
+            <pc:docMk/>
+            <pc:sldMk cId="4231749475" sldId="261"/>
+            <ac:spMk id="7" creationId="{4C4BB239-1887-2C43-85E7-6C6E3BDA08CC}"/>
+          </ac:spMkLst>
+        </pc:spChg>
+      </pc:sldChg>
+      <pc:sldChg chg="addSp modSp mod">
+        <pc:chgData name="東村邦彦 / TOUMURA，KUNIHIKO" userId="aa80352f-8581-4c8d-8917-6e2824d17308" providerId="ADAL" clId="{E4505F40-E669-9843-86C7-DDD04F4FF44E}" dt="2020-10-20T07:57:40.881" v="548" actId="20577"/>
+        <pc:sldMkLst>
+          <pc:docMk/>
+          <pc:sldMk cId="2285214902" sldId="262"/>
+        </pc:sldMkLst>
+        <pc:spChg chg="mod">
+          <ac:chgData name="東村邦彦 / TOUMURA，KUNIHIKO" userId="aa80352f-8581-4c8d-8917-6e2824d17308" providerId="ADAL" clId="{E4505F40-E669-9843-86C7-DDD04F4FF44E}" dt="2020-10-20T07:56:25.437" v="482" actId="20577"/>
+          <ac:spMkLst>
+            <pc:docMk/>
+            <pc:sldMk cId="2285214902" sldId="262"/>
+            <ac:spMk id="7" creationId="{D5A234C8-24F4-9A4F-A87F-E30CE381F52A}"/>
+          </ac:spMkLst>
+        </pc:spChg>
+        <pc:spChg chg="add mod">
+          <ac:chgData name="東村邦彦 / TOUMURA，KUNIHIKO" userId="aa80352f-8581-4c8d-8917-6e2824d17308" providerId="ADAL" clId="{E4505F40-E669-9843-86C7-DDD04F4FF44E}" dt="2020-10-20T07:57:40.881" v="548" actId="20577"/>
+          <ac:spMkLst>
+            <pc:docMk/>
+            <pc:sldMk cId="2285214902" sldId="262"/>
+            <ac:spMk id="11" creationId="{BB9F4A43-0474-A94C-B81A-B93D42CC731D}"/>
+          </ac:spMkLst>
+        </pc:spChg>
+        <pc:spChg chg="mod">
+          <ac:chgData name="東村邦彦 / TOUMURA，KUNIHIKO" userId="aa80352f-8581-4c8d-8917-6e2824d17308" providerId="ADAL" clId="{E4505F40-E669-9843-86C7-DDD04F4FF44E}" dt="2020-10-20T07:56:48.968" v="488" actId="1076"/>
+          <ac:spMkLst>
+            <pc:docMk/>
+            <pc:sldMk cId="2285214902" sldId="262"/>
+            <ac:spMk id="12" creationId="{73B36EDB-ADD0-B14F-9E0A-A02F38DC6194}"/>
+          </ac:spMkLst>
+        </pc:spChg>
+      </pc:sldChg>
+      <pc:sldChg chg="modSp mod">
+        <pc:chgData name="東村邦彦 / TOUMURA，KUNIHIKO" userId="aa80352f-8581-4c8d-8917-6e2824d17308" providerId="ADAL" clId="{E4505F40-E669-9843-86C7-DDD04F4FF44E}" dt="2020-10-20T07:54:48.602" v="461" actId="20577"/>
+        <pc:sldMkLst>
+          <pc:docMk/>
+          <pc:sldMk cId="2951448461" sldId="263"/>
+        </pc:sldMkLst>
+        <pc:spChg chg="mod">
+          <ac:chgData name="東村邦彦 / TOUMURA，KUNIHIKO" userId="aa80352f-8581-4c8d-8917-6e2824d17308" providerId="ADAL" clId="{E4505F40-E669-9843-86C7-DDD04F4FF44E}" dt="2020-10-20T07:54:48.602" v="461" actId="20577"/>
+          <ac:spMkLst>
+            <pc:docMk/>
+            <pc:sldMk cId="2951448461" sldId="263"/>
+            <ac:spMk id="3" creationId="{8FEDE062-60C4-584A-9492-DDAC9314B5EA}"/>
+          </ac:spMkLst>
+        </pc:spChg>
+      </pc:sldChg>
+      <pc:sldChg chg="modSp mod">
+        <pc:chgData name="東村邦彦 / TOUMURA，KUNIHIKO" userId="aa80352f-8581-4c8d-8917-6e2824d17308" providerId="ADAL" clId="{E4505F40-E669-9843-86C7-DDD04F4FF44E}" dt="2020-10-20T07:59:47.053" v="645" actId="20577"/>
+        <pc:sldMkLst>
+          <pc:docMk/>
+          <pc:sldMk cId="490680745" sldId="264"/>
+        </pc:sldMkLst>
+        <pc:spChg chg="mod">
+          <ac:chgData name="東村邦彦 / TOUMURA，KUNIHIKO" userId="aa80352f-8581-4c8d-8917-6e2824d17308" providerId="ADAL" clId="{E4505F40-E669-9843-86C7-DDD04F4FF44E}" dt="2020-10-20T07:59:47.053" v="645" actId="20577"/>
+          <ac:spMkLst>
+            <pc:docMk/>
+            <pc:sldMk cId="490680745" sldId="264"/>
+            <ac:spMk id="3" creationId="{5EAA2F55-8D4D-AB41-99CC-53DAA7BB6155}"/>
+          </ac:spMkLst>
+        </pc:spChg>
+      </pc:sldChg>
+      <pc:sldChg chg="addSp delSp modSp mod">
+        <pc:chgData name="東村邦彦 / TOUMURA，KUNIHIKO" userId="aa80352f-8581-4c8d-8917-6e2824d17308" providerId="ADAL" clId="{E4505F40-E669-9843-86C7-DDD04F4FF44E}" dt="2020-10-20T08:03:09.344" v="653" actId="1076"/>
+        <pc:sldMkLst>
+          <pc:docMk/>
+          <pc:sldMk cId="2211391353" sldId="265"/>
+        </pc:sldMkLst>
+        <pc:spChg chg="add del mod">
+          <ac:chgData name="東村邦彦 / TOUMURA，KUNIHIKO" userId="aa80352f-8581-4c8d-8917-6e2824d17308" providerId="ADAL" clId="{E4505F40-E669-9843-86C7-DDD04F4FF44E}" dt="2020-10-20T08:02:51.871" v="649" actId="478"/>
+          <ac:spMkLst>
+            <pc:docMk/>
+            <pc:sldMk cId="2211391353" sldId="265"/>
+            <ac:spMk id="14" creationId="{CAEB1BBF-BC70-BE47-AC2B-8D9B2C47730D}"/>
+          </ac:spMkLst>
+        </pc:spChg>
+        <pc:picChg chg="add mod">
+          <ac:chgData name="東村邦彦 / TOUMURA，KUNIHIKO" userId="aa80352f-8581-4c8d-8917-6e2824d17308" providerId="ADAL" clId="{E4505F40-E669-9843-86C7-DDD04F4FF44E}" dt="2020-10-20T08:03:09.344" v="653" actId="1076"/>
+          <ac:picMkLst>
+            <pc:docMk/>
+            <pc:sldMk cId="2211391353" sldId="265"/>
+            <ac:picMk id="7" creationId="{6AF0A149-F343-1645-80C0-70FE9D9CEE32}"/>
+          </ac:picMkLst>
+        </pc:picChg>
+        <pc:picChg chg="del">
+          <ac:chgData name="東村邦彦 / TOUMURA，KUNIHIKO" userId="aa80352f-8581-4c8d-8917-6e2824d17308" providerId="ADAL" clId="{E4505F40-E669-9843-86C7-DDD04F4FF44E}" dt="2020-10-20T08:02:46.142" v="648" actId="478"/>
+          <ac:picMkLst>
+            <pc:docMk/>
+            <pc:sldMk cId="2211391353" sldId="265"/>
+            <ac:picMk id="8" creationId="{2388F5DF-A619-0E40-A413-C6FCFFB00A40}"/>
+          </ac:picMkLst>
+        </pc:picChg>
+      </pc:sldChg>
+    </pc:docChg>
+  </pc:docChgLst>
+</pc:chgInfo>
 </file>
 
 <file path=ppt/handoutMasters/handoutMaster1.xml><?xml version="1.0" encoding="utf-8"?>
@@ -250,7 +496,7 @@
           <a:p>
             <a:fld id="{E5EF4218-9A27-4811-BA71-71018B456D8F}" type="datetimeFigureOut">
               <a:rPr kumimoji="1" lang="ja-JP" altLang="en-US" smtClean="0"/>
-              <a:t>2020/10/19</a:t>
+              <a:t>2020/10/20</a:t>
             </a:fld>
             <a:endParaRPr kumimoji="1" lang="ja-JP" altLang="en-US"/>
           </a:p>
@@ -427,7 +673,7 @@
           <a:p>
             <a:fld id="{8389B5DD-0274-BF45-B4C5-62E173E8F634}" type="datetimeFigureOut">
               <a:rPr lang="en-US" smtClean="0"/>
-              <a:t>10/19/2020</a:t>
+              <a:t>10/20/20</a:t>
             </a:fld>
             <a:endParaRPr lang="en-US"/>
           </a:p>
@@ -1083,7 +1329,7 @@
           <a:p>
             <a:fld id="{2F93E591-CC8D-C74E-8EED-098A7FB5E64D}" type="datetime1">
               <a:rPr lang="en-CA" smtClean="0"/>
-              <a:t>2020-10-19</a:t>
+              <a:t>2020-10-20</a:t>
             </a:fld>
             <a:endParaRPr lang="en-US"/>
           </a:p>
@@ -1391,7 +1637,7 @@
           <a:p>
             <a:fld id="{2E1BC118-574D-594E-ABEA-A7C82666C9AB}" type="datetime1">
               <a:rPr lang="en-CA" smtClean="0"/>
-              <a:t>2020-10-19</a:t>
+              <a:t>2020-10-20</a:t>
             </a:fld>
             <a:endParaRPr lang="en-US"/>
           </a:p>
@@ -1767,7 +2013,7 @@
           <a:p>
             <a:fld id="{B929AB1E-7FD9-0A40-B7C0-508CCACB3E9A}" type="datetime1">
               <a:rPr lang="en-CA" smtClean="0"/>
-              <a:t>2020-10-19</a:t>
+              <a:t>2020-10-20</a:t>
             </a:fld>
             <a:endParaRPr lang="en-US" dirty="0"/>
           </a:p>
@@ -2036,7 +2282,7 @@
           <a:p>
             <a:fld id="{5AE8723F-57EA-4C47-97B9-92AFDEEF85DC}" type="datetime1">
               <a:rPr lang="en-CA" smtClean="0"/>
-              <a:t>2020-10-19</a:t>
+              <a:t>2020-10-20</a:t>
             </a:fld>
             <a:endParaRPr lang="en-US"/>
           </a:p>
@@ -2439,7 +2685,7 @@
           <a:p>
             <a:fld id="{B2B00E5D-EC04-AA49-8D52-0FCB6E08F63D}" type="datetime1">
               <a:rPr lang="en-CA" smtClean="0"/>
-              <a:t>2020-10-19</a:t>
+              <a:t>2020-10-20</a:t>
             </a:fld>
             <a:endParaRPr lang="en-US"/>
           </a:p>
@@ -2984,7 +3230,7 @@
           <a:p>
             <a:fld id="{FF90905C-10FF-8047-AA7E-6DC7E8B6AF51}" type="datetime1">
               <a:rPr lang="en-CA" smtClean="0"/>
-              <a:t>2020-10-19</a:t>
+              <a:t>2020-10-20</a:t>
             </a:fld>
             <a:endParaRPr lang="en-US"/>
           </a:p>
@@ -3197,7 +3443,7 @@
           <a:p>
             <a:fld id="{D1CE86E2-4400-D342-BEEC-F9C1ADF6F9F7}" type="datetime1">
               <a:rPr lang="en-CA" smtClean="0"/>
-              <a:t>2020-10-19</a:t>
+              <a:t>2020-10-20</a:t>
             </a:fld>
             <a:endParaRPr lang="en-US"/>
           </a:p>
@@ -3373,7 +3619,7 @@
           <a:p>
             <a:fld id="{74358A08-7221-7F45-8378-69D5559861DD}" type="datetime1">
               <a:rPr lang="en-CA" smtClean="0"/>
-              <a:t>2020-10-19</a:t>
+              <a:t>2020-10-20</a:t>
             </a:fld>
             <a:endParaRPr lang="en-US"/>
           </a:p>
@@ -3784,7 +4030,7 @@
           <a:p>
             <a:fld id="{08C20FDB-303D-8A4E-83B7-226DD88B97BD}" type="datetime1">
               <a:rPr lang="en-CA" smtClean="0"/>
-              <a:t>2020-10-19</a:t>
+              <a:t>2020-10-20</a:t>
             </a:fld>
             <a:endParaRPr lang="en-US"/>
           </a:p>
@@ -4143,7 +4389,7 @@
           <a:p>
             <a:fld id="{0A9EBA37-9D18-D34A-A88D-1B00AA06E95C}" type="datetime1">
               <a:rPr lang="en-CA" smtClean="0"/>
-              <a:t>2020-10-19</a:t>
+              <a:t>2020-10-20</a:t>
             </a:fld>
             <a:endParaRPr lang="en-US"/>
           </a:p>
@@ -4522,7 +4768,7 @@
             <a:fld id="{B73A2E78-F38A-E046-ACDB-668F070D1EF6}" type="datetime1">
               <a:rPr lang="en-CA" smtClean="0"/>
               <a:pPr/>
-              <a:t>2020-10-19</a:t>
+              <a:t>2020-10-20</a:t>
             </a:fld>
             <a:endParaRPr lang="en-US" dirty="0"/>
           </a:p>
@@ -5092,12 +5338,8 @@
           <a:p>
             <a:pPr lvl="2"/>
             <a:r>
-              <a:rPr lang="en-US" dirty="0"/>
-              <a:t>T</a:t>
-            </a:r>
-            <a:r>
               <a:rPr lang="en-JP" dirty="0"/>
-              <a:t>o protect, we should use them in a private network which is protected by authentication (WPA, 802.1x, VPN, etc.)</a:t>
+              <a:t>We should use them in a private network which is protected by authentication (WPA, 802.1x, VPN, etc.), or in a space that is protected by physical security.</a:t>
             </a:r>
           </a:p>
           <a:p>
@@ -5222,7 +5464,7 @@
           <a:p>
             <a:fld id="{B929AB1E-7FD9-0A40-B7C0-508CCACB3E9A}" type="datetime1">
               <a:rPr lang="en-CA" smtClean="0"/>
-              <a:t>2020-10-19</a:t>
+              <a:t>2020-10-20</a:t>
             </a:fld>
             <a:endParaRPr lang="en-US" dirty="0"/>
           </a:p>
@@ -5408,7 +5650,7 @@
           <a:p>
             <a:fld id="{BF92DA42-2970-1B4D-9C1F-77F249CD7467}" type="datetime1">
               <a:rPr lang="en-CA" smtClean="0"/>
-              <a:t>2020-10-19</a:t>
+              <a:t>2020-10-20</a:t>
             </a:fld>
             <a:endParaRPr lang="en-US" dirty="0"/>
           </a:p>
@@ -5609,7 +5851,7 @@
           <a:p>
             <a:fld id="{B929AB1E-7FD9-0A40-B7C0-508CCACB3E9A}" type="datetime1">
               <a:rPr lang="en-CA" smtClean="0"/>
-              <a:t>2020-10-19</a:t>
+              <a:t>2020-10-20</a:t>
             </a:fld>
             <a:endParaRPr lang="en-US" dirty="0"/>
           </a:p>
@@ -5639,7 +5881,7 @@
         </p:blipFill>
         <p:spPr>
           <a:xfrm>
-            <a:off x="6058703" y="1292714"/>
+            <a:off x="12295117" y="1215877"/>
             <a:ext cx="6133297" cy="4426246"/>
           </a:xfrm>
         </p:spPr>
@@ -5661,7 +5903,7 @@
         <p:spPr>
           <a:xfrm>
             <a:off x="838199" y="1298222"/>
-            <a:ext cx="5066392" cy="4878741"/>
+            <a:ext cx="5066392" cy="5058128"/>
           </a:xfrm>
           <a:prstGeom prst="rect">
             <a:avLst/>
@@ -5669,7 +5911,7 @@
         </p:spPr>
         <p:txBody>
           <a:bodyPr vert="horz" lIns="91440" tIns="45720" rIns="91440" bIns="45720" rtlCol="0">
-            <a:normAutofit lnSpcReduction="10000"/>
+            <a:normAutofit fontScale="92500" lnSpcReduction="10000"/>
           </a:bodyPr>
           <a:lstStyle>
             <a:lvl1pPr marL="228600" indent="-228600" algn="l" defTabSz="914400" rtl="0" eaLnBrk="1" latinLnBrk="0" hangingPunct="1">
@@ -5845,7 +6087,21 @@
             <a:pPr lvl="1"/>
             <a:r>
               <a:rPr lang="en-US" dirty="0"/>
-              <a:t>Find an URL of Thing Description of Thing or Thing Directory.</a:t>
+              <a:t>Find an URL which points to Thing Description of Thing or Thing Directory.</a:t>
+            </a:r>
+          </a:p>
+          <a:p>
+            <a:pPr lvl="1"/>
+            <a:r>
+              <a:rPr lang="en-US" dirty="0"/>
+              <a:t>Consumer may issue HTTP GET request to the URL to retrieve a TD.  </a:t>
+            </a:r>
+          </a:p>
+          <a:p>
+            <a:pPr lvl="2"/>
+            <a:r>
+              <a:rPr lang="en-US" dirty="0"/>
+              <a:t>Accessing to TD SHOULD be authenticated</a:t>
             </a:r>
           </a:p>
           <a:p>
@@ -5859,17 +6115,13 @@
             <a:pPr lvl="1"/>
             <a:r>
               <a:rPr lang="en-US" dirty="0"/>
-              <a:t>Consumer may issue HTTP GET request to the URL to retrieve a TD.  </a:t>
-            </a:r>
-          </a:p>
-          <a:p>
-            <a:pPr lvl="1"/>
-            <a:r>
-              <a:rPr lang="en-US" dirty="0"/>
               <a:t>TD’s Content-type MUST be: 	</a:t>
             </a:r>
             <a:r>
               <a:rPr lang="en-US" sz="1800" dirty="0">
+                <a:solidFill>
+                  <a:srgbClr val="C00000"/>
+                </a:solidFill>
                 <a:latin typeface="Consolas" panose="020B0609020204030204" pitchFamily="49" charset="0"/>
                 <a:cs typeface="Consolas" panose="020B0609020204030204" pitchFamily="49" charset="0"/>
               </a:rPr>
@@ -5877,12 +6129,18 @@
             </a:r>
             <a:r>
               <a:rPr lang="en-US" sz="1800" dirty="0" err="1">
+                <a:solidFill>
+                  <a:srgbClr val="C00000"/>
+                </a:solidFill>
                 <a:latin typeface="Consolas" panose="020B0609020204030204" pitchFamily="49" charset="0"/>
                 <a:cs typeface="Consolas" panose="020B0609020204030204" pitchFamily="49" charset="0"/>
               </a:rPr>
               <a:t>td+json</a:t>
             </a:r>
             <a:endParaRPr lang="en-US" dirty="0">
+              <a:solidFill>
+                <a:srgbClr val="C00000"/>
+              </a:solidFill>
               <a:latin typeface="Consolas" panose="020B0609020204030204" pitchFamily="49" charset="0"/>
               <a:cs typeface="Consolas" panose="020B0609020204030204" pitchFamily="49" charset="0"/>
             </a:endParaRPr>
@@ -5891,26 +6149,43 @@
             <a:pPr lvl="1"/>
             <a:r>
               <a:rPr lang="en-US" dirty="0"/>
-              <a:t>”@type” of TD MUST be:</a:t>
+              <a:t>”@type” of Directory TD MUST be “</a:t>
+            </a:r>
+            <a:r>
+              <a:rPr lang="en-US" dirty="0">
+                <a:solidFill>
+                  <a:srgbClr val="C00000"/>
+                </a:solidFill>
+                <a:latin typeface="Consolas" panose="020B0609020204030204" pitchFamily="49" charset="0"/>
+                <a:cs typeface="Consolas" panose="020B0609020204030204" pitchFamily="49" charset="0"/>
+              </a:rPr>
+              <a:t>Directory</a:t>
+            </a:r>
+            <a:r>
+              <a:rPr lang="en-US" dirty="0"/>
+              <a:t>”</a:t>
             </a:r>
           </a:p>
           <a:p>
             <a:pPr lvl="2"/>
             <a:r>
               <a:rPr lang="en-US" dirty="0"/>
-              <a:t>{“@type”: “Thing”} =&gt; Thing</a:t>
-            </a:r>
-          </a:p>
-          <a:p>
-            <a:pPr lvl="2"/>
+              <a:t>Type for Thing TD is ”</a:t>
+            </a:r>
+            <a:r>
+              <a:rPr lang="en-US" dirty="0">
+                <a:solidFill>
+                  <a:srgbClr val="C00000"/>
+                </a:solidFill>
+                <a:latin typeface="Consolas" panose="020B0609020204030204" pitchFamily="49" charset="0"/>
+                <a:cs typeface="Consolas" panose="020B0609020204030204" pitchFamily="49" charset="0"/>
+              </a:rPr>
+              <a:t>Thing</a:t>
+            </a:r>
             <a:r>
               <a:rPr lang="en-US" dirty="0"/>
-              <a:t>{“@type”: “Directory”} =&gt; Directory</a:t>
-            </a:r>
-          </a:p>
-          <a:p>
-            <a:pPr lvl="1"/>
-            <a:endParaRPr lang="en-US" dirty="0"/>
+              <a:t>”, but not mandatory.</a:t>
+            </a:r>
           </a:p>
         </p:txBody>
       </p:sp>
@@ -6007,6 +6282,47 @@
           </a:p>
         </p:txBody>
       </p:sp>
+      <p:pic>
+        <p:nvPicPr>
+          <p:cNvPr id="7" name="Picture 6">
+            <a:extLst>
+              <a:ext uri="{FF2B5EF4-FFF2-40B4-BE49-F238E27FC236}">
+                <a16:creationId xmlns:a16="http://schemas.microsoft.com/office/drawing/2014/main" id="{F0E0DDF5-60B4-1243-B6A0-B62270B5876F}"/>
+              </a:ext>
+            </a:extLst>
+          </p:cNvPr>
+          <p:cNvPicPr>
+            <a:picLocks noChangeAspect="1"/>
+          </p:cNvPicPr>
+          <p:nvPr/>
+        </p:nvPicPr>
+        <p:blipFill>
+          <a:blip r:embed="rId3">
+            <a:clrChange>
+              <a:clrFrom>
+                <a:srgbClr val="FFFFFF"/>
+              </a:clrFrom>
+              <a:clrTo>
+                <a:srgbClr val="FFFFFF">
+                  <a:alpha val="0"/>
+                </a:srgbClr>
+              </a:clrTo>
+            </a:clrChange>
+          </a:blip>
+          <a:stretch>
+            <a:fillRect/>
+          </a:stretch>
+        </p:blipFill>
+        <p:spPr>
+          <a:xfrm>
+            <a:off x="5994450" y="1346442"/>
+            <a:ext cx="6133297" cy="4426246"/>
+          </a:xfrm>
+          <a:prstGeom prst="rect">
+            <a:avLst/>
+          </a:prstGeom>
+        </p:spPr>
+      </p:pic>
     </p:spTree>
     <p:extLst>
       <p:ext uri="{BB962C8B-B14F-4D97-AF65-F5344CB8AC3E}">
@@ -6145,7 +6461,7 @@
           <a:p>
             <a:fld id="{B929AB1E-7FD9-0A40-B7C0-508CCACB3E9A}" type="datetime1">
               <a:rPr lang="en-CA" smtClean="0"/>
-              <a:t>2020-10-19</a:t>
+              <a:t>2020-10-20</a:t>
             </a:fld>
             <a:endParaRPr lang="en-US" dirty="0"/>
           </a:p>
@@ -6184,42 +6500,6 @@
             <a:off x="8409302" y="1076325"/>
             <a:ext cx="1905000" cy="1905000"/>
           </a:xfrm>
-        </p:spPr>
-      </p:pic>
-      <p:pic>
-        <p:nvPicPr>
-          <p:cNvPr id="14" name="Graphic 13">
-            <a:extLst>
-              <a:ext uri="{FF2B5EF4-FFF2-40B4-BE49-F238E27FC236}">
-                <a16:creationId xmlns:a16="http://schemas.microsoft.com/office/drawing/2014/main" id="{14931EF9-A841-504B-89CC-7E6A22318043}"/>
-              </a:ext>
-            </a:extLst>
-          </p:cNvPr>
-          <p:cNvPicPr>
-            <a:picLocks noChangeAspect="1"/>
-          </p:cNvPicPr>
-          <p:nvPr/>
-        </p:nvPicPr>
-        <p:blipFill>
-          <a:blip r:embed="rId4">
-            <a:extLst>
-              <a:ext uri="{96DAC541-7B7A-43D3-8B79-37D633B846F1}">
-                <asvg:svgBlip xmlns:asvg="http://schemas.microsoft.com/office/drawing/2016/SVG/main" r:embed="rId5"/>
-              </a:ext>
-            </a:extLst>
-          </a:blip>
-          <a:stretch>
-            <a:fillRect/>
-          </a:stretch>
-        </p:blipFill>
-        <p:spPr>
-          <a:xfrm>
-            <a:off x="8409302" y="3876675"/>
-            <a:ext cx="1905000" cy="1905000"/>
-          </a:xfrm>
-          <a:prstGeom prst="rect">
-            <a:avLst/>
-          </a:prstGeom>
         </p:spPr>
       </p:pic>
       <p:sp>
@@ -6433,6 +6713,24 @@
             </a:r>
           </a:p>
           <a:p>
+            <a:pPr marL="0" indent="0">
+              <a:buNone/>
+            </a:pPr>
+            <a:endParaRPr lang="en-US" dirty="0"/>
+          </a:p>
+          <a:p>
+            <a:pPr marL="0" indent="0">
+              <a:buNone/>
+            </a:pPr>
+            <a:endParaRPr lang="en-US" dirty="0"/>
+          </a:p>
+          <a:p>
+            <a:pPr marL="0" indent="0">
+              <a:buNone/>
+            </a:pPr>
+            <a:endParaRPr lang="en-US" dirty="0"/>
+          </a:p>
+          <a:p>
             <a:endParaRPr lang="en-US" dirty="0"/>
           </a:p>
           <a:p>
@@ -6478,7 +6776,7 @@
             <a:pPr algn="ctr"/>
             <a:r>
               <a:rPr lang="en-JP" dirty="0"/>
-              <a:t>Example 1: a QR code that contains an URL</a:t>
+              <a:t> QR code that contains an URL</a:t>
             </a:r>
           </a:p>
           <a:p>
@@ -6488,50 +6786,7 @@
                 <a:latin typeface="Consolas" panose="020B0609020204030204" pitchFamily="49" charset="0"/>
                 <a:cs typeface="Consolas" panose="020B0609020204030204" pitchFamily="49" charset="0"/>
               </a:rPr>
-              <a:t>‘http://ktorpi.local:1880/.well-known/wot-thing description’</a:t>
-            </a:r>
-          </a:p>
-        </p:txBody>
-      </p:sp>
-      <p:sp>
-        <p:nvSpPr>
-          <p:cNvPr id="17" name="TextBox 16">
-            <a:extLst>
-              <a:ext uri="{FF2B5EF4-FFF2-40B4-BE49-F238E27FC236}">
-                <a16:creationId xmlns:a16="http://schemas.microsoft.com/office/drawing/2014/main" id="{8B07DE17-690D-1B41-B644-94C4C58280A1}"/>
-              </a:ext>
-            </a:extLst>
-          </p:cNvPr>
-          <p:cNvSpPr txBox="1"/>
-          <p:nvPr/>
-        </p:nvSpPr>
-        <p:spPr>
-          <a:xfrm>
-            <a:off x="7278778" y="5691290"/>
-            <a:ext cx="4409219" cy="646331"/>
-          </a:xfrm>
-          <a:prstGeom prst="rect">
-            <a:avLst/>
-          </a:prstGeom>
-          <a:noFill/>
-        </p:spPr>
-        <p:txBody>
-          <a:bodyPr wrap="none" rtlCol="0">
-            <a:spAutoFit/>
-          </a:bodyPr>
-          <a:lstStyle/>
-          <a:p>
-            <a:pPr algn="ctr"/>
-            <a:r>
-              <a:rPr lang="en-JP" dirty="0"/>
-              <a:t>Example 2: a QR code that contains entire TD</a:t>
-            </a:r>
-          </a:p>
-          <a:p>
-            <a:pPr algn="ctr"/>
-            <a:r>
-              <a:rPr lang="en-JP" dirty="0"/>
-              <a:t>(for comparison; gzip+base64 encoded)</a:t>
+              <a:t>‘http://ktorpi.local:1880/.well-known/wot-thing-description’</a:t>
             </a:r>
           </a:p>
         </p:txBody>
@@ -6674,7 +6929,7 @@
           <a:p>
             <a:fld id="{B929AB1E-7FD9-0A40-B7C0-508CCACB3E9A}" type="datetime1">
               <a:rPr lang="en-CA" smtClean="0"/>
-              <a:t>2020-10-19</a:t>
+              <a:t>2020-10-20</a:t>
             </a:fld>
             <a:endParaRPr lang="en-US" dirty="0"/>
           </a:p>
@@ -6878,7 +7133,7 @@
           <a:p>
             <a:r>
               <a:rPr lang="en-US" dirty="0"/>
-              <a:t>Thing or Directory can host their Thing Description as a site-wide metadata</a:t>
+              <a:t>Thing or Directory Service can host their Thing Description as a site-wide metadata</a:t>
             </a:r>
           </a:p>
           <a:p>
@@ -6887,11 +7142,11 @@
                 <a:latin typeface="Consolas" panose="020B0609020204030204" pitchFamily="49" charset="0"/>
                 <a:cs typeface="Consolas" panose="020B0609020204030204" pitchFamily="49" charset="0"/>
               </a:rPr>
-              <a:t>“/.well-known/wot-thing-description”</a:t>
+              <a:t>“wot-thing-description”</a:t>
             </a:r>
             <a:r>
               <a:rPr lang="en-US" dirty="0"/>
-              <a:t> (tentative)</a:t>
+              <a:t> (tentative) for URL suffix</a:t>
             </a:r>
           </a:p>
           <a:p>
@@ -6902,34 +7157,98 @@
             </a:r>
             <a:r>
               <a:rPr lang="en-US" dirty="0" err="1"/>
-              <a:t>tdir.example.com</a:t>
+              <a:t>tdd.example.com</a:t>
             </a:r>
             <a:r>
               <a:rPr lang="en-US" dirty="0"/>
-              <a:t>, then issue HTTP GET https://</a:t>
-            </a:r>
-            <a:r>
-              <a:rPr lang="en-US" dirty="0" err="1"/>
-              <a:t>tdir.example.com</a:t>
-            </a:r>
-            <a:r>
+              <a:t>, then issue HTTP request</a:t>
+            </a:r>
+            <a:br>
               <a:rPr lang="en-US" dirty="0"/>
-              <a:t>/.well-known/wot-thing-description to retrieve a Thing Description</a:t>
+            </a:br>
+            <a:r>
+              <a:rPr lang="en-US" sz="2000" dirty="0">
+                <a:solidFill>
+                  <a:srgbClr val="C00000"/>
+                </a:solidFill>
+                <a:latin typeface="Consolas" panose="020B0609020204030204" pitchFamily="49" charset="0"/>
+                <a:cs typeface="Consolas" panose="020B0609020204030204" pitchFamily="49" charset="0"/>
+              </a:rPr>
+              <a:t>GET</a:t>
+            </a:r>
+            <a:r>
+              <a:rPr lang="en-US" sz="2000" dirty="0"/>
+              <a:t> </a:t>
+            </a:r>
+            <a:r>
+              <a:rPr lang="en-US" sz="2000" dirty="0">
+                <a:solidFill>
+                  <a:srgbClr val="C00000"/>
+                </a:solidFill>
+                <a:latin typeface="Consolas" panose="020B0609020204030204" pitchFamily="49" charset="0"/>
+                <a:cs typeface="Consolas" panose="020B0609020204030204" pitchFamily="49" charset="0"/>
+              </a:rPr>
+              <a:t>https://</a:t>
+            </a:r>
+            <a:r>
+              <a:rPr lang="en-US" sz="2000" dirty="0" err="1">
+                <a:solidFill>
+                  <a:srgbClr val="C00000"/>
+                </a:solidFill>
+                <a:latin typeface="Consolas" panose="020B0609020204030204" pitchFamily="49" charset="0"/>
+                <a:cs typeface="Consolas" panose="020B0609020204030204" pitchFamily="49" charset="0"/>
+              </a:rPr>
+              <a:t>tdd.example.com</a:t>
+            </a:r>
+            <a:r>
+              <a:rPr lang="en-US" sz="2000" dirty="0">
+                <a:solidFill>
+                  <a:srgbClr val="C00000"/>
+                </a:solidFill>
+                <a:latin typeface="Consolas" panose="020B0609020204030204" pitchFamily="49" charset="0"/>
+                <a:cs typeface="Consolas" panose="020B0609020204030204" pitchFamily="49" charset="0"/>
+              </a:rPr>
+              <a:t>/.well-known/wot-thing-description</a:t>
+            </a:r>
+            <a:r>
+              <a:rPr lang="en-US" dirty="0">
+                <a:solidFill>
+                  <a:srgbClr val="C00000"/>
+                </a:solidFill>
+              </a:rPr>
+              <a:t> </a:t>
+            </a:r>
+            <a:br>
+              <a:rPr lang="en-US" dirty="0">
+                <a:solidFill>
+                  <a:srgbClr val="C00000"/>
+                </a:solidFill>
+              </a:rPr>
+            </a:br>
+            <a:r>
+              <a:rPr lang="en-US" dirty="0"/>
+              <a:t>to try to retrieve a Thing Description</a:t>
             </a:r>
           </a:p>
           <a:p>
             <a:pPr lvl="1"/>
             <a:r>
               <a:rPr lang="en-US" dirty="0"/>
-              <a:t>Example 2: Broadcast/multicasting CoAP GET request to /.well-known/wot-thing-description to find Things/Directory Services in a same subnet. </a:t>
-            </a:r>
-          </a:p>
-          <a:p>
-            <a:pPr marL="0" indent="0">
-              <a:buFont typeface="Arial" panose="020B0604020202020204" pitchFamily="34" charset="0"/>
-              <a:buNone/>
-            </a:pPr>
-            <a:endParaRPr lang="en-US" dirty="0"/>
+              <a:t>Example 2: Broadcast/multicasting CoAP request </a:t>
+            </a:r>
+            <a:br>
+              <a:rPr lang="en-US" dirty="0"/>
+            </a:br>
+            <a:r>
+              <a:rPr lang="en-US" sz="2000" dirty="0">
+                <a:solidFill>
+                  <a:srgbClr val="C00000"/>
+                </a:solidFill>
+                <a:latin typeface="Consolas" panose="020B0609020204030204" pitchFamily="49" charset="0"/>
+                <a:cs typeface="Consolas" panose="020B0609020204030204" pitchFamily="49" charset="0"/>
+              </a:rPr>
+              <a:t>GET /.well-known/wot-thing-description</a:t>
+            </a:r>
           </a:p>
         </p:txBody>
       </p:sp>
@@ -7071,7 +7390,7 @@
           <a:p>
             <a:fld id="{B929AB1E-7FD9-0A40-B7C0-508CCACB3E9A}" type="datetime1">
               <a:rPr lang="en-CA" smtClean="0"/>
-              <a:t>2020-10-19</a:t>
+              <a:t>2020-10-20</a:t>
             </a:fld>
             <a:endParaRPr lang="en-US" dirty="0"/>
           </a:p>
@@ -7773,35 +8092,6 @@
           </a:p>
         </p:txBody>
       </p:sp>
-      <p:pic>
-        <p:nvPicPr>
-          <p:cNvPr id="8" name="Content Placeholder 7">
-            <a:extLst>
-              <a:ext uri="{FF2B5EF4-FFF2-40B4-BE49-F238E27FC236}">
-                <a16:creationId xmlns:a16="http://schemas.microsoft.com/office/drawing/2014/main" id="{2388F5DF-A619-0E40-A413-C6FCFFB00A40}"/>
-              </a:ext>
-            </a:extLst>
-          </p:cNvPr>
-          <p:cNvPicPr>
-            <a:picLocks noGrp="1" noChangeAspect="1"/>
-          </p:cNvPicPr>
-          <p:nvPr>
-            <p:ph idx="1"/>
-          </p:nvPr>
-        </p:nvPicPr>
-        <p:blipFill>
-          <a:blip r:embed="rId2"/>
-          <a:stretch>
-            <a:fillRect/>
-          </a:stretch>
-        </p:blipFill>
-        <p:spPr>
-          <a:xfrm>
-            <a:off x="1217260" y="1735037"/>
-            <a:ext cx="9757480" cy="4878740"/>
-          </a:xfrm>
-        </p:spPr>
-      </p:pic>
       <p:sp>
         <p:nvSpPr>
           <p:cNvPr id="4" name="Footer Placeholder 3">
@@ -7882,7 +8172,7 @@
           <a:p>
             <a:fld id="{B929AB1E-7FD9-0A40-B7C0-508CCACB3E9A}" type="datetime1">
               <a:rPr lang="en-CA" smtClean="0"/>
-              <a:t>2020-10-19</a:t>
+              <a:t>2020-10-20</a:t>
             </a:fld>
             <a:endParaRPr lang="en-US" dirty="0"/>
           </a:p>
@@ -7903,7 +8193,7 @@
           <p:nvPr/>
         </p:nvPicPr>
         <p:blipFill>
-          <a:blip r:embed="rId3"/>
+          <a:blip r:embed="rId2"/>
           <a:stretch>
             <a:fillRect/>
           </a:stretch>
@@ -8521,6 +8811,42 @@
           </a:p>
         </p:txBody>
       </p:sp>
+      <p:pic>
+        <p:nvPicPr>
+          <p:cNvPr id="7" name="Graphic 6">
+            <a:extLst>
+              <a:ext uri="{FF2B5EF4-FFF2-40B4-BE49-F238E27FC236}">
+                <a16:creationId xmlns:a16="http://schemas.microsoft.com/office/drawing/2014/main" id="{6AF0A149-F343-1645-80C0-70FE9D9CEE32}"/>
+              </a:ext>
+            </a:extLst>
+          </p:cNvPr>
+          <p:cNvPicPr>
+            <a:picLocks noChangeAspect="1"/>
+          </p:cNvPicPr>
+          <p:nvPr/>
+        </p:nvPicPr>
+        <p:blipFill>
+          <a:blip r:embed="rId3">
+            <a:extLst>
+              <a:ext uri="{96DAC541-7B7A-43D3-8B79-37D633B846F1}">
+                <asvg:svgBlip xmlns:asvg="http://schemas.microsoft.com/office/drawing/2016/SVG/main" r:embed="rId4"/>
+              </a:ext>
+            </a:extLst>
+          </a:blip>
+          <a:stretch>
+            <a:fillRect/>
+          </a:stretch>
+        </p:blipFill>
+        <p:spPr>
+          <a:xfrm>
+            <a:off x="1743842" y="2032267"/>
+            <a:ext cx="8704315" cy="4352158"/>
+          </a:xfrm>
+          <a:prstGeom prst="rect">
+            <a:avLst/>
+          </a:prstGeom>
+        </p:spPr>
+      </p:pic>
     </p:spTree>
     <p:extLst>
       <p:ext uri="{BB962C8B-B14F-4D97-AF65-F5344CB8AC3E}">
@@ -8655,7 +8981,7 @@
                 <a:latin typeface="Consolas" panose="020B0609020204030204" pitchFamily="49" charset="0"/>
                 <a:cs typeface="Consolas" panose="020B0609020204030204" pitchFamily="49" charset="0"/>
               </a:rPr>
-              <a:t>ep</a:t>
+              <a:t>et</a:t>
             </a:r>
             <a:r>
               <a:rPr lang="en-JP" dirty="0"/>
@@ -8788,7 +9114,7 @@
           <a:p>
             <a:fld id="{B929AB1E-7FD9-0A40-B7C0-508CCACB3E9A}" type="datetime1">
               <a:rPr lang="en-CA" smtClean="0"/>
-              <a:t>2020-10-19</a:t>
+              <a:t>2020-10-20</a:t>
             </a:fld>
             <a:endParaRPr lang="en-US" dirty="0"/>
           </a:p>
@@ -9316,7 +9642,7 @@
               <a:rPr lang="en-US" smtClean="0"/>
               <a:t>9</a:t>
             </a:fld>
-            <a:endParaRPr lang="en-US"/>
+            <a:endParaRPr lang="en-US" dirty="0"/>
           </a:p>
         </p:txBody>
       </p:sp>
@@ -9343,7 +9669,7 @@
           <a:p>
             <a:fld id="{B929AB1E-7FD9-0A40-B7C0-508CCACB3E9A}" type="datetime1">
               <a:rPr lang="en-CA" smtClean="0"/>
-              <a:t>2020-10-19</a:t>
+              <a:t>2020-10-20</a:t>
             </a:fld>
             <a:endParaRPr lang="en-US" dirty="0"/>
           </a:p>
@@ -9545,7 +9871,7 @@
           <a:p>
             <a:r>
               <a:rPr lang="en-US" dirty="0"/>
-              <a:t>DID can be used for pointing a Thing or Thing Directory.</a:t>
+              <a:t>DID can be used for pointing a Thing Description of Thing or Thing Directory.</a:t>
             </a:r>
           </a:p>
           <a:p>
@@ -9817,8 +10143,8 @@
         </p:nvSpPr>
         <p:spPr>
           <a:xfrm>
-            <a:off x="2401354" y="4354850"/>
-            <a:ext cx="8325293" cy="2308324"/>
+            <a:off x="6041204" y="4241150"/>
+            <a:ext cx="5964009" cy="1600438"/>
           </a:xfrm>
           <a:prstGeom prst="rect">
             <a:avLst/>
@@ -9831,29 +10157,18 @@
           <a:lstStyle/>
           <a:p>
             <a:r>
-              <a:rPr lang="en-US" dirty="0">
+              <a:rPr lang="en-US" sz="1400" dirty="0">
                 <a:solidFill>
                   <a:srgbClr val="383A42"/>
                 </a:solidFill>
                 <a:latin typeface="Menlo" panose="020B0609030804020204" pitchFamily="49" charset="0"/>
               </a:rPr>
-              <a:t>{ </a:t>
-            </a:r>
-          </a:p>
-          <a:p>
-            <a:r>
-              <a:rPr lang="en-US" dirty="0">
-                <a:solidFill>
-                  <a:srgbClr val="383A42"/>
-                </a:solidFill>
-                <a:latin typeface="Menlo" panose="020B0609030804020204" pitchFamily="49" charset="0"/>
-              </a:rPr>
-              <a:t>  …</a:t>
-            </a:r>
-          </a:p>
-          <a:p>
-            <a:r>
-              <a:rPr lang="en-US" dirty="0">
+              <a:t>{ …</a:t>
+            </a:r>
+          </a:p>
+          <a:p>
+            <a:r>
+              <a:rPr lang="en-US" sz="1400" dirty="0">
                 <a:solidFill>
                   <a:srgbClr val="383A42"/>
                 </a:solidFill>
@@ -9862,7 +10177,7 @@
               <a:t>  </a:t>
             </a:r>
             <a:r>
-              <a:rPr lang="en-US" dirty="0">
+              <a:rPr lang="en-US" sz="1400" dirty="0">
                 <a:solidFill>
                   <a:srgbClr val="986801"/>
                 </a:solidFill>
@@ -9871,7 +10186,7 @@
               <a:t>"service"</a:t>
             </a:r>
             <a:r>
-              <a:rPr lang="en-US" dirty="0">
+              <a:rPr lang="en-US" sz="1400" dirty="0">
                 <a:solidFill>
                   <a:srgbClr val="383A42"/>
                 </a:solidFill>
@@ -9882,7 +10197,7 @@
           </a:p>
           <a:p>
             <a:r>
-              <a:rPr lang="en-US" dirty="0">
+              <a:rPr lang="en-US" sz="1400" dirty="0">
                 <a:solidFill>
                   <a:srgbClr val="383A42"/>
                 </a:solidFill>
@@ -9891,7 +10206,7 @@
               <a:t>      </a:t>
             </a:r>
             <a:r>
-              <a:rPr lang="en-US" dirty="0">
+              <a:rPr lang="en-US" sz="1400" dirty="0">
                 <a:solidFill>
                   <a:srgbClr val="986801"/>
                 </a:solidFill>
@@ -9900,7 +10215,7 @@
               <a:t>"id"</a:t>
             </a:r>
             <a:r>
-              <a:rPr lang="en-US" dirty="0">
+              <a:rPr lang="en-US" sz="1400" dirty="0">
                 <a:solidFill>
                   <a:srgbClr val="383A42"/>
                 </a:solidFill>
@@ -9909,7 +10224,7 @@
               <a:t>: </a:t>
             </a:r>
             <a:r>
-              <a:rPr lang="en-US" dirty="0">
+              <a:rPr lang="en-US" sz="1400" dirty="0">
                 <a:solidFill>
                   <a:srgbClr val="42803C"/>
                 </a:solidFill>
@@ -9918,7 +10233,7 @@
               <a:t>"</a:t>
             </a:r>
             <a:r>
-              <a:rPr lang="en-US" dirty="0" err="1">
+              <a:rPr lang="en-US" sz="1400" dirty="0" err="1">
                 <a:solidFill>
                   <a:srgbClr val="42803C"/>
                 </a:solidFill>
@@ -9927,7 +10242,7 @@
               <a:t>did:example:wotdiscoveryexample#td</a:t>
             </a:r>
             <a:r>
-              <a:rPr lang="en-US" dirty="0">
+              <a:rPr lang="en-US" sz="1400" dirty="0">
                 <a:solidFill>
                   <a:srgbClr val="42803C"/>
                 </a:solidFill>
@@ -9936,7 +10251,7 @@
               <a:t>"</a:t>
             </a:r>
             <a:r>
-              <a:rPr lang="en-US" dirty="0">
+              <a:rPr lang="en-US" sz="1400" dirty="0">
                 <a:solidFill>
                   <a:srgbClr val="383A42"/>
                 </a:solidFill>
@@ -9947,7 +10262,7 @@
           </a:p>
           <a:p>
             <a:r>
-              <a:rPr lang="en-US" dirty="0">
+              <a:rPr lang="en-US" sz="1400" dirty="0">
                 <a:solidFill>
                   <a:srgbClr val="383A42"/>
                 </a:solidFill>
@@ -9956,7 +10271,7 @@
               <a:t>      </a:t>
             </a:r>
             <a:r>
-              <a:rPr lang="en-US" dirty="0">
+              <a:rPr lang="en-US" sz="1400" dirty="0">
                 <a:solidFill>
                   <a:srgbClr val="986801"/>
                 </a:solidFill>
@@ -9965,7 +10280,7 @@
               <a:t>"type"</a:t>
             </a:r>
             <a:r>
-              <a:rPr lang="en-US" dirty="0">
+              <a:rPr lang="en-US" sz="1400" dirty="0">
                 <a:solidFill>
                   <a:srgbClr val="383A42"/>
                 </a:solidFill>
@@ -9974,7 +10289,7 @@
               <a:t>: </a:t>
             </a:r>
             <a:r>
-              <a:rPr lang="en-US" dirty="0">
+              <a:rPr lang="en-US" sz="1400" dirty="0">
                 <a:solidFill>
                   <a:srgbClr val="42803C"/>
                 </a:solidFill>
@@ -9983,7 +10298,7 @@
               <a:t>"</a:t>
             </a:r>
             <a:r>
-              <a:rPr lang="en-US" dirty="0" err="1">
+              <a:rPr lang="en-US" sz="1400" dirty="0" err="1">
                 <a:solidFill>
                   <a:srgbClr val="42803C"/>
                 </a:solidFill>
@@ -9992,7 +10307,7 @@
               <a:t>WotThingDescription</a:t>
             </a:r>
             <a:r>
-              <a:rPr lang="en-US" dirty="0">
+              <a:rPr lang="en-US" sz="1400" dirty="0">
                 <a:solidFill>
                   <a:srgbClr val="42803C"/>
                 </a:solidFill>
@@ -10001,7 +10316,7 @@
               <a:t>"</a:t>
             </a:r>
             <a:r>
-              <a:rPr lang="en-US" dirty="0">
+              <a:rPr lang="en-US" sz="1400" dirty="0">
                 <a:solidFill>
                   <a:srgbClr val="383A42"/>
                 </a:solidFill>
@@ -10012,7 +10327,7 @@
           </a:p>
           <a:p>
             <a:r>
-              <a:rPr lang="en-US" dirty="0">
+              <a:rPr lang="en-US" sz="1400" dirty="0">
                 <a:solidFill>
                   <a:srgbClr val="383A42"/>
                 </a:solidFill>
@@ -10021,7 +10336,7 @@
               <a:t>      </a:t>
             </a:r>
             <a:r>
-              <a:rPr lang="en-US" dirty="0">
+              <a:rPr lang="en-US" sz="1400" dirty="0">
                 <a:solidFill>
                   <a:srgbClr val="986801"/>
                 </a:solidFill>
@@ -10030,7 +10345,7 @@
               <a:t>"</a:t>
             </a:r>
             <a:r>
-              <a:rPr lang="en-US" dirty="0" err="1">
+              <a:rPr lang="en-US" sz="1400" dirty="0" err="1">
                 <a:solidFill>
                   <a:srgbClr val="986801"/>
                 </a:solidFill>
@@ -10039,7 +10354,7 @@
               <a:t>serviceEndpoint</a:t>
             </a:r>
             <a:r>
-              <a:rPr lang="en-US" dirty="0">
+              <a:rPr lang="en-US" sz="1400" dirty="0">
                 <a:solidFill>
                   <a:srgbClr val="986801"/>
                 </a:solidFill>
@@ -10048,7 +10363,7 @@
               <a:t>"</a:t>
             </a:r>
             <a:r>
-              <a:rPr lang="en-US" dirty="0">
+              <a:rPr lang="en-US" sz="1400" dirty="0">
                 <a:solidFill>
                   <a:srgbClr val="383A42"/>
                 </a:solidFill>
@@ -10057,7 +10372,7 @@
               <a:t>: </a:t>
             </a:r>
             <a:r>
-              <a:rPr lang="en-US" dirty="0">
+              <a:rPr lang="en-US" sz="1400" dirty="0">
                 <a:solidFill>
                   <a:srgbClr val="42803C"/>
                 </a:solidFill>
@@ -10066,7 +10381,7 @@
               <a:t>"https://</a:t>
             </a:r>
             <a:r>
-              <a:rPr lang="en-US" dirty="0" err="1">
+              <a:rPr lang="en-US" sz="1400" dirty="0" err="1">
                 <a:solidFill>
                   <a:srgbClr val="42803C"/>
                 </a:solidFill>
@@ -10075,7 +10390,7 @@
               <a:t>wot.example.com</a:t>
             </a:r>
             <a:r>
-              <a:rPr lang="en-US" dirty="0">
+              <a:rPr lang="en-US" sz="1400" dirty="0">
                 <a:solidFill>
                   <a:srgbClr val="42803C"/>
                 </a:solidFill>
@@ -10086,7 +10401,7 @@
           </a:p>
           <a:p>
             <a:r>
-              <a:rPr lang="en-US" dirty="0">
+              <a:rPr lang="en-US" sz="1400" dirty="0">
                 <a:solidFill>
                   <a:srgbClr val="383A42"/>
                 </a:solidFill>
@@ -10097,7 +10412,7 @@
           </a:p>
           <a:p>
             <a:r>
-              <a:rPr lang="en-US" dirty="0">
+              <a:rPr lang="en-US" sz="1400" dirty="0">
                 <a:solidFill>
                   <a:srgbClr val="383A42"/>
                 </a:solidFill>
@@ -10105,7 +10420,47 @@
               </a:rPr>
               <a:t>}</a:t>
             </a:r>
-            <a:endParaRPr lang="en-JP" dirty="0"/>
+            <a:endParaRPr lang="en-JP" sz="1400" dirty="0"/>
+          </a:p>
+        </p:txBody>
+      </p:sp>
+      <p:sp>
+        <p:nvSpPr>
+          <p:cNvPr id="11" name="TextBox 10">
+            <a:extLst>
+              <a:ext uri="{FF2B5EF4-FFF2-40B4-BE49-F238E27FC236}">
+                <a16:creationId xmlns:a16="http://schemas.microsoft.com/office/drawing/2014/main" id="{BB9F4A43-0474-A94C-B81A-B93D42CC731D}"/>
+              </a:ext>
+            </a:extLst>
+          </p:cNvPr>
+          <p:cNvSpPr txBox="1"/>
+          <p:nvPr/>
+        </p:nvSpPr>
+        <p:spPr>
+          <a:xfrm>
+            <a:off x="6220205" y="5647612"/>
+            <a:ext cx="5399941" cy="369332"/>
+          </a:xfrm>
+          <a:prstGeom prst="rect">
+            <a:avLst/>
+          </a:prstGeom>
+          <a:noFill/>
+        </p:spPr>
+        <p:txBody>
+          <a:bodyPr wrap="none" rtlCol="0">
+            <a:spAutoFit/>
+          </a:bodyPr>
+          <a:lstStyle/>
+          <a:p>
+            <a:pPr algn="ctr"/>
+            <a:r>
+              <a:rPr lang="en-JP" dirty="0"/>
+              <a:t> Example Service Endpoint description in DID document</a:t>
+            </a:r>
+            <a:endParaRPr lang="en-JP" sz="1200" dirty="0">
+              <a:latin typeface="Consolas" panose="020B0609020204030204" pitchFamily="49" charset="0"/>
+              <a:cs typeface="Consolas" panose="020B0609020204030204" pitchFamily="49" charset="0"/>
+            </a:endParaRPr>
           </a:p>
         </p:txBody>
       </p:sp>

</xml_diff>